<commit_message>
checkpoint: new fuel/surcharge field added and cards updated; new selection mechanism and entity models
</commit_message>
<xml_diff>
--- a/v3/assets/map/Default.pptx
+++ b/v3/assets/map/Default.pptx
@@ -15389,7 +15389,7 @@
           <p:nvPr>
             <p:extLst>
               <p:ext uri="{D42A27DB-BD31-4B8C-83A1-F6EECF244321}">
-                <p14:modId xmlns:p14="http://schemas.microsoft.com/office/powerpoint/2010/main" val="2760599569"/>
+                <p14:modId xmlns:p14="http://schemas.microsoft.com/office/powerpoint/2010/main" val="575600835"/>
               </p:ext>
             </p:extLst>
           </p:nvPr>
@@ -17923,7 +17923,7 @@
                     <a:lstStyle/>
                     <a:p>
                       <a:pPr algn="ctr"/>
-                      <a:endParaRPr lang="en-US" sz="800">
+                      <a:endParaRPr lang="en-US" sz="800" dirty="0">
                         <a:latin typeface="3270-MEDIUM" panose="02000609000000000000" pitchFamily="49" charset="77"/>
                         <a:ea typeface="3270-MEDIUM" panose="02000609000000000000" pitchFamily="49" charset="77"/>
                       </a:endParaRPr>
@@ -18037,7 +18037,7 @@
                       <a:tailEnd type="none" w="med" len="med"/>
                     </a:lnB>
                     <a:solidFill>
-                      <a:schemeClr val="accent6"/>
+                      <a:schemeClr val="accent1"/>
                     </a:solidFill>
                   </a:tcPr>
                 </a:tc>
@@ -18831,7 +18831,7 @@
                     <a:lstStyle/>
                     <a:p>
                       <a:pPr algn="ctr"/>
-                      <a:endParaRPr lang="en-US" sz="800">
+                      <a:endParaRPr lang="en-US" sz="800" dirty="0">
                         <a:latin typeface="3270-MEDIUM" panose="02000609000000000000" pitchFamily="49" charset="77"/>
                         <a:ea typeface="3270-MEDIUM" panose="02000609000000000000" pitchFamily="49" charset="77"/>
                       </a:endParaRPr>
@@ -18883,7 +18883,7 @@
                       <a:tailEnd type="none" w="med" len="med"/>
                     </a:lnB>
                     <a:solidFill>
-                      <a:schemeClr val="accent6"/>
+                      <a:schemeClr val="accent1"/>
                     </a:solidFill>
                   </a:tcPr>
                 </a:tc>
@@ -19790,7 +19790,7 @@
                       <a:tailEnd type="none" w="med" len="med"/>
                     </a:lnB>
                     <a:solidFill>
-                      <a:schemeClr val="accent6"/>
+                      <a:schemeClr val="accent1"/>
                     </a:solidFill>
                   </a:tcPr>
                 </a:tc>
@@ -22773,7 +22773,7 @@
                       <a:tailEnd type="none" w="med" len="med"/>
                     </a:lnB>
                     <a:solidFill>
-                      <a:schemeClr val="accent6"/>
+                      <a:schemeClr val="accent1"/>
                     </a:solidFill>
                   </a:tcPr>
                 </a:tc>

</xml_diff>